<commit_message>
Added sections, slide numbers
</commit_message>
<xml_diff>
--- a/Python/Interfacing_C_C++_Fortran/python-interfacing.pptx
+++ b/Python/Interfacing_C_C++_Fortran/python-interfacing.pptx
@@ -4,6 +4,9 @@
   <p:sldMasterIdLst>
     <p:sldMasterId id="2147483648" r:id="rId1"/>
   </p:sldMasterIdLst>
+  <p:notesMasterIdLst>
+    <p:notesMasterId r:id="rId34"/>
+  </p:notesMasterIdLst>
   <p:sldIdLst>
     <p:sldId id="256" r:id="rId2"/>
     <p:sldId id="257" r:id="rId3"/>
@@ -135,7 +138,411 @@
       </a:defRPr>
     </a:lvl9pPr>
   </p:defaultTextStyle>
+  <p:extLst>
+    <p:ext uri="{521415D9-36F7-43E2-AB2F-B90AF26B5E84}">
+      <p14:sectionLst xmlns:p14="http://schemas.microsoft.com/office/powerpoint/2010/main">
+        <p14:section name="Default Section" id="{0F39E778-7B44-44F5-B01E-9ACF2E8E9FC3}">
+          <p14:sldIdLst>
+            <p14:sldId id="256"/>
+            <p14:sldId id="257"/>
+            <p14:sldId id="271"/>
+          </p14:sldIdLst>
+        </p14:section>
+        <p14:section name="Ctypes" id="{30084E94-330C-4146-AA56-B5A100B9ED10}">
+          <p14:sldIdLst>
+            <p14:sldId id="273"/>
+            <p14:sldId id="272"/>
+            <p14:sldId id="258"/>
+            <p14:sldId id="260"/>
+            <p14:sldId id="261"/>
+            <p14:sldId id="262"/>
+            <p14:sldId id="263"/>
+            <p14:sldId id="264"/>
+            <p14:sldId id="265"/>
+            <p14:sldId id="266"/>
+            <p14:sldId id="267"/>
+            <p14:sldId id="268"/>
+            <p14:sldId id="269"/>
+            <p14:sldId id="270"/>
+          </p14:sldIdLst>
+        </p14:section>
+        <p14:section name="SWIG" id="{F0329997-BAA3-48B9-88F0-07DD01F6BF08}">
+          <p14:sldIdLst>
+            <p14:sldId id="274"/>
+            <p14:sldId id="275"/>
+            <p14:sldId id="276"/>
+            <p14:sldId id="277"/>
+            <p14:sldId id="279"/>
+            <p14:sldId id="287"/>
+            <p14:sldId id="288"/>
+            <p14:sldId id="278"/>
+          </p14:sldIdLst>
+        </p14:section>
+        <p14:section name="f2py" id="{6D8FC45D-66CA-4A42-BF46-C104DB715E02}">
+          <p14:sldIdLst>
+            <p14:sldId id="280"/>
+            <p14:sldId id="281"/>
+            <p14:sldId id="282"/>
+            <p14:sldId id="283"/>
+            <p14:sldId id="284"/>
+            <p14:sldId id="286"/>
+            <p14:sldId id="285"/>
+          </p14:sldIdLst>
+        </p14:section>
+      </p14:sectionLst>
+    </p:ext>
+  </p:extLst>
 </p:presentation>
+</file>
+
+<file path=ppt/notesMasters/notesMaster1.xml><?xml version="1.0" encoding="utf-8"?>
+<p:notesMaster xmlns:a="http://schemas.openxmlformats.org/drawingml/2006/main" xmlns:r="http://schemas.openxmlformats.org/officeDocument/2006/relationships" xmlns:p="http://schemas.openxmlformats.org/presentationml/2006/main">
+  <p:cSld>
+    <p:bg>
+      <p:bgRef idx="1001">
+        <a:schemeClr val="bg1"/>
+      </p:bgRef>
+    </p:bg>
+    <p:spTree>
+      <p:nvGrpSpPr>
+        <p:cNvPr id="1" name=""/>
+        <p:cNvGrpSpPr/>
+        <p:nvPr/>
+      </p:nvGrpSpPr>
+      <p:grpSpPr>
+        <a:xfrm>
+          <a:off x="0" y="0"/>
+          <a:ext cx="0" cy="0"/>
+          <a:chOff x="0" y="0"/>
+          <a:chExt cx="0" cy="0"/>
+        </a:xfrm>
+      </p:grpSpPr>
+      <p:sp>
+        <p:nvSpPr>
+          <p:cNvPr id="2" name="Header Placeholder 1"/>
+          <p:cNvSpPr>
+            <a:spLocks noGrp="1"/>
+          </p:cNvSpPr>
+          <p:nvPr>
+            <p:ph type="hdr" sz="quarter"/>
+          </p:nvPr>
+        </p:nvSpPr>
+        <p:spPr>
+          <a:xfrm>
+            <a:off x="0" y="0"/>
+            <a:ext cx="2971800" cy="457200"/>
+          </a:xfrm>
+          <a:prstGeom prst="rect">
+            <a:avLst/>
+          </a:prstGeom>
+        </p:spPr>
+        <p:txBody>
+          <a:bodyPr vert="horz" lIns="91440" tIns="45720" rIns="91440" bIns="45720" rtlCol="0"/>
+          <a:lstStyle>
+            <a:lvl1pPr algn="l">
+              <a:defRPr sz="1200"/>
+            </a:lvl1pPr>
+          </a:lstStyle>
+          <a:p>
+            <a:endParaRPr lang="nl-BE"/>
+          </a:p>
+        </p:txBody>
+      </p:sp>
+      <p:sp>
+        <p:nvSpPr>
+          <p:cNvPr id="3" name="Date Placeholder 2"/>
+          <p:cNvSpPr>
+            <a:spLocks noGrp="1"/>
+          </p:cNvSpPr>
+          <p:nvPr>
+            <p:ph type="dt" idx="1"/>
+          </p:nvPr>
+        </p:nvSpPr>
+        <p:spPr>
+          <a:xfrm>
+            <a:off x="3884613" y="0"/>
+            <a:ext cx="2971800" cy="457200"/>
+          </a:xfrm>
+          <a:prstGeom prst="rect">
+            <a:avLst/>
+          </a:prstGeom>
+        </p:spPr>
+        <p:txBody>
+          <a:bodyPr vert="horz" lIns="91440" tIns="45720" rIns="91440" bIns="45720" rtlCol="0"/>
+          <a:lstStyle>
+            <a:lvl1pPr algn="r">
+              <a:defRPr sz="1200"/>
+            </a:lvl1pPr>
+          </a:lstStyle>
+          <a:p>
+            <a:fld id="{9BEFF6BD-6E6D-4676-A003-30633C19CE37}" type="datetimeFigureOut">
+              <a:rPr lang="nl-BE" smtClean="0"/>
+              <a:t>10/03/2016</a:t>
+            </a:fld>
+            <a:endParaRPr lang="nl-BE"/>
+          </a:p>
+        </p:txBody>
+      </p:sp>
+      <p:sp>
+        <p:nvSpPr>
+          <p:cNvPr id="4" name="Slide Image Placeholder 3"/>
+          <p:cNvSpPr>
+            <a:spLocks noGrp="1" noRot="1" noChangeAspect="1"/>
+          </p:cNvSpPr>
+          <p:nvPr>
+            <p:ph type="sldImg" idx="2"/>
+          </p:nvPr>
+        </p:nvSpPr>
+        <p:spPr>
+          <a:xfrm>
+            <a:off x="1143000" y="685800"/>
+            <a:ext cx="4572000" cy="3429000"/>
+          </a:xfrm>
+          <a:prstGeom prst="rect">
+            <a:avLst/>
+          </a:prstGeom>
+          <a:noFill/>
+          <a:ln w="12700">
+            <a:solidFill>
+              <a:prstClr val="black"/>
+            </a:solidFill>
+          </a:ln>
+        </p:spPr>
+        <p:txBody>
+          <a:bodyPr vert="horz" lIns="91440" tIns="45720" rIns="91440" bIns="45720" rtlCol="0" anchor="ctr"/>
+          <a:lstStyle/>
+          <a:p>
+            <a:endParaRPr lang="nl-BE"/>
+          </a:p>
+        </p:txBody>
+      </p:sp>
+      <p:sp>
+        <p:nvSpPr>
+          <p:cNvPr id="5" name="Notes Placeholder 4"/>
+          <p:cNvSpPr>
+            <a:spLocks noGrp="1"/>
+          </p:cNvSpPr>
+          <p:nvPr>
+            <p:ph type="body" sz="quarter" idx="3"/>
+          </p:nvPr>
+        </p:nvSpPr>
+        <p:spPr>
+          <a:xfrm>
+            <a:off x="685800" y="4343400"/>
+            <a:ext cx="5486400" cy="4114800"/>
+          </a:xfrm>
+          <a:prstGeom prst="rect">
+            <a:avLst/>
+          </a:prstGeom>
+        </p:spPr>
+        <p:txBody>
+          <a:bodyPr vert="horz" lIns="91440" tIns="45720" rIns="91440" bIns="45720" rtlCol="0"/>
+          <a:lstStyle/>
+          <a:p>
+            <a:pPr lvl="0"/>
+            <a:r>
+              <a:rPr lang="en-US" smtClean="0"/>
+              <a:t>Click to edit Master text styles</a:t>
+            </a:r>
+          </a:p>
+          <a:p>
+            <a:pPr lvl="1"/>
+            <a:r>
+              <a:rPr lang="en-US" smtClean="0"/>
+              <a:t>Second level</a:t>
+            </a:r>
+          </a:p>
+          <a:p>
+            <a:pPr lvl="2"/>
+            <a:r>
+              <a:rPr lang="en-US" smtClean="0"/>
+              <a:t>Third level</a:t>
+            </a:r>
+          </a:p>
+          <a:p>
+            <a:pPr lvl="3"/>
+            <a:r>
+              <a:rPr lang="en-US" smtClean="0"/>
+              <a:t>Fourth level</a:t>
+            </a:r>
+          </a:p>
+          <a:p>
+            <a:pPr lvl="4"/>
+            <a:r>
+              <a:rPr lang="en-US" smtClean="0"/>
+              <a:t>Fifth level</a:t>
+            </a:r>
+            <a:endParaRPr lang="nl-BE"/>
+          </a:p>
+        </p:txBody>
+      </p:sp>
+      <p:sp>
+        <p:nvSpPr>
+          <p:cNvPr id="6" name="Footer Placeholder 5"/>
+          <p:cNvSpPr>
+            <a:spLocks noGrp="1"/>
+          </p:cNvSpPr>
+          <p:nvPr>
+            <p:ph type="ftr" sz="quarter" idx="4"/>
+          </p:nvPr>
+        </p:nvSpPr>
+        <p:spPr>
+          <a:xfrm>
+            <a:off x="0" y="8685213"/>
+            <a:ext cx="2971800" cy="457200"/>
+          </a:xfrm>
+          <a:prstGeom prst="rect">
+            <a:avLst/>
+          </a:prstGeom>
+        </p:spPr>
+        <p:txBody>
+          <a:bodyPr vert="horz" lIns="91440" tIns="45720" rIns="91440" bIns="45720" rtlCol="0" anchor="b"/>
+          <a:lstStyle>
+            <a:lvl1pPr algn="l">
+              <a:defRPr sz="1200"/>
+            </a:lvl1pPr>
+          </a:lstStyle>
+          <a:p>
+            <a:endParaRPr lang="nl-BE"/>
+          </a:p>
+        </p:txBody>
+      </p:sp>
+      <p:sp>
+        <p:nvSpPr>
+          <p:cNvPr id="7" name="Slide Number Placeholder 6"/>
+          <p:cNvSpPr>
+            <a:spLocks noGrp="1"/>
+          </p:cNvSpPr>
+          <p:nvPr>
+            <p:ph type="sldNum" sz="quarter" idx="5"/>
+          </p:nvPr>
+        </p:nvSpPr>
+        <p:spPr>
+          <a:xfrm>
+            <a:off x="3884613" y="8685213"/>
+            <a:ext cx="2971800" cy="457200"/>
+          </a:xfrm>
+          <a:prstGeom prst="rect">
+            <a:avLst/>
+          </a:prstGeom>
+        </p:spPr>
+        <p:txBody>
+          <a:bodyPr vert="horz" lIns="91440" tIns="45720" rIns="91440" bIns="45720" rtlCol="0" anchor="b"/>
+          <a:lstStyle>
+            <a:lvl1pPr algn="r">
+              <a:defRPr sz="1200"/>
+            </a:lvl1pPr>
+          </a:lstStyle>
+          <a:p>
+            <a:fld id="{80DC7639-BC9F-4358-801C-FC934758098B}" type="slidenum">
+              <a:rPr lang="nl-BE" smtClean="0"/>
+              <a:t>‹#›</a:t>
+            </a:fld>
+            <a:endParaRPr lang="nl-BE"/>
+          </a:p>
+        </p:txBody>
+      </p:sp>
+    </p:spTree>
+    <p:extLst>
+      <p:ext uri="{BB962C8B-B14F-4D97-AF65-F5344CB8AC3E}">
+        <p14:creationId xmlns:p14="http://schemas.microsoft.com/office/powerpoint/2010/main" val="886664878"/>
+      </p:ext>
+    </p:extLst>
+  </p:cSld>
+  <p:clrMap bg1="lt1" tx1="dk1" bg2="lt2" tx2="dk2" accent1="accent1" accent2="accent2" accent3="accent3" accent4="accent4" accent5="accent5" accent6="accent6" hlink="hlink" folHlink="folHlink"/>
+  <p:notesStyle>
+    <a:lvl1pPr marL="0" algn="l" defTabSz="914400" rtl="0" eaLnBrk="1" latinLnBrk="0" hangingPunct="1">
+      <a:defRPr sz="1200" kern="1200">
+        <a:solidFill>
+          <a:schemeClr val="tx1"/>
+        </a:solidFill>
+        <a:latin typeface="+mn-lt"/>
+        <a:ea typeface="+mn-ea"/>
+        <a:cs typeface="+mn-cs"/>
+      </a:defRPr>
+    </a:lvl1pPr>
+    <a:lvl2pPr marL="457200" algn="l" defTabSz="914400" rtl="0" eaLnBrk="1" latinLnBrk="0" hangingPunct="1">
+      <a:defRPr sz="1200" kern="1200">
+        <a:solidFill>
+          <a:schemeClr val="tx1"/>
+        </a:solidFill>
+        <a:latin typeface="+mn-lt"/>
+        <a:ea typeface="+mn-ea"/>
+        <a:cs typeface="+mn-cs"/>
+      </a:defRPr>
+    </a:lvl2pPr>
+    <a:lvl3pPr marL="914400" algn="l" defTabSz="914400" rtl="0" eaLnBrk="1" latinLnBrk="0" hangingPunct="1">
+      <a:defRPr sz="1200" kern="1200">
+        <a:solidFill>
+          <a:schemeClr val="tx1"/>
+        </a:solidFill>
+        <a:latin typeface="+mn-lt"/>
+        <a:ea typeface="+mn-ea"/>
+        <a:cs typeface="+mn-cs"/>
+      </a:defRPr>
+    </a:lvl3pPr>
+    <a:lvl4pPr marL="1371600" algn="l" defTabSz="914400" rtl="0" eaLnBrk="1" latinLnBrk="0" hangingPunct="1">
+      <a:defRPr sz="1200" kern="1200">
+        <a:solidFill>
+          <a:schemeClr val="tx1"/>
+        </a:solidFill>
+        <a:latin typeface="+mn-lt"/>
+        <a:ea typeface="+mn-ea"/>
+        <a:cs typeface="+mn-cs"/>
+      </a:defRPr>
+    </a:lvl4pPr>
+    <a:lvl5pPr marL="1828800" algn="l" defTabSz="914400" rtl="0" eaLnBrk="1" latinLnBrk="0" hangingPunct="1">
+      <a:defRPr sz="1200" kern="1200">
+        <a:solidFill>
+          <a:schemeClr val="tx1"/>
+        </a:solidFill>
+        <a:latin typeface="+mn-lt"/>
+        <a:ea typeface="+mn-ea"/>
+        <a:cs typeface="+mn-cs"/>
+      </a:defRPr>
+    </a:lvl5pPr>
+    <a:lvl6pPr marL="2286000" algn="l" defTabSz="914400" rtl="0" eaLnBrk="1" latinLnBrk="0" hangingPunct="1">
+      <a:defRPr sz="1200" kern="1200">
+        <a:solidFill>
+          <a:schemeClr val="tx1"/>
+        </a:solidFill>
+        <a:latin typeface="+mn-lt"/>
+        <a:ea typeface="+mn-ea"/>
+        <a:cs typeface="+mn-cs"/>
+      </a:defRPr>
+    </a:lvl6pPr>
+    <a:lvl7pPr marL="2743200" algn="l" defTabSz="914400" rtl="0" eaLnBrk="1" latinLnBrk="0" hangingPunct="1">
+      <a:defRPr sz="1200" kern="1200">
+        <a:solidFill>
+          <a:schemeClr val="tx1"/>
+        </a:solidFill>
+        <a:latin typeface="+mn-lt"/>
+        <a:ea typeface="+mn-ea"/>
+        <a:cs typeface="+mn-cs"/>
+      </a:defRPr>
+    </a:lvl7pPr>
+    <a:lvl8pPr marL="3200400" algn="l" defTabSz="914400" rtl="0" eaLnBrk="1" latinLnBrk="0" hangingPunct="1">
+      <a:defRPr sz="1200" kern="1200">
+        <a:solidFill>
+          <a:schemeClr val="tx1"/>
+        </a:solidFill>
+        <a:latin typeface="+mn-lt"/>
+        <a:ea typeface="+mn-ea"/>
+        <a:cs typeface="+mn-cs"/>
+      </a:defRPr>
+    </a:lvl8pPr>
+    <a:lvl9pPr marL="3657600" algn="l" defTabSz="914400" rtl="0" eaLnBrk="1" latinLnBrk="0" hangingPunct="1">
+      <a:defRPr sz="1200" kern="1200">
+        <a:solidFill>
+          <a:schemeClr val="tx1"/>
+        </a:solidFill>
+        <a:latin typeface="+mn-lt"/>
+        <a:ea typeface="+mn-ea"/>
+        <a:cs typeface="+mn-cs"/>
+      </a:defRPr>
+    </a:lvl9pPr>
+  </p:notesStyle>
+</p:notesMaster>
 </file>
 
 <file path=ppt/slideLayouts/slideLayout1.xml><?xml version="1.0" encoding="utf-8"?>
@@ -317,9 +724,9 @@
           <a:bodyPr/>
           <a:lstStyle/>
           <a:p>
-            <a:fld id="{665393C4-2231-440C-A42F-19E1CAA437CB}" type="datetimeFigureOut">
+            <a:fld id="{34410DD2-EBDB-466F-85AC-4F16341E8362}" type="datetime1">
               <a:rPr lang="en-US" smtClean="0"/>
-              <a:t>2015-08-17</a:t>
+              <a:t>2016-03-10</a:t>
             </a:fld>
             <a:endParaRPr lang="en-US"/>
           </a:p>
@@ -487,9 +894,9 @@
           <a:bodyPr/>
           <a:lstStyle/>
           <a:p>
-            <a:fld id="{665393C4-2231-440C-A42F-19E1CAA437CB}" type="datetimeFigureOut">
+            <a:fld id="{68DD66B8-2031-40EC-8284-BE14713AC805}" type="datetime1">
               <a:rPr lang="en-US" smtClean="0"/>
-              <a:t>2015-08-17</a:t>
+              <a:t>2016-03-10</a:t>
             </a:fld>
             <a:endParaRPr lang="en-US"/>
           </a:p>
@@ -667,9 +1074,9 @@
           <a:bodyPr/>
           <a:lstStyle/>
           <a:p>
-            <a:fld id="{665393C4-2231-440C-A42F-19E1CAA437CB}" type="datetimeFigureOut">
+            <a:fld id="{D4FC6F8D-3415-4B6F-A4B6-D1E7873EC511}" type="datetime1">
               <a:rPr lang="en-US" smtClean="0"/>
-              <a:t>2015-08-17</a:t>
+              <a:t>2016-03-10</a:t>
             </a:fld>
             <a:endParaRPr lang="en-US"/>
           </a:p>
@@ -837,9 +1244,9 @@
           <a:bodyPr/>
           <a:lstStyle/>
           <a:p>
-            <a:fld id="{665393C4-2231-440C-A42F-19E1CAA437CB}" type="datetimeFigureOut">
+            <a:fld id="{57E0CC26-D1F4-43C5-B8FF-2AEEF97500A8}" type="datetime1">
               <a:rPr lang="en-US" smtClean="0"/>
-              <a:t>2015-08-17</a:t>
+              <a:t>2016-03-10</a:t>
             </a:fld>
             <a:endParaRPr lang="en-US"/>
           </a:p>
@@ -1083,9 +1490,9 @@
           <a:bodyPr/>
           <a:lstStyle/>
           <a:p>
-            <a:fld id="{665393C4-2231-440C-A42F-19E1CAA437CB}" type="datetimeFigureOut">
+            <a:fld id="{05B36489-DCC9-4260-B4E1-EAD348902B66}" type="datetime1">
               <a:rPr lang="en-US" smtClean="0"/>
-              <a:t>2015-08-17</a:t>
+              <a:t>2016-03-10</a:t>
             </a:fld>
             <a:endParaRPr lang="en-US"/>
           </a:p>
@@ -1371,9 +1778,9 @@
           <a:bodyPr/>
           <a:lstStyle/>
           <a:p>
-            <a:fld id="{665393C4-2231-440C-A42F-19E1CAA437CB}" type="datetimeFigureOut">
+            <a:fld id="{1B1DD94E-62ED-43C0-A519-90565B79CD09}" type="datetime1">
               <a:rPr lang="en-US" smtClean="0"/>
-              <a:t>2015-08-17</a:t>
+              <a:t>2016-03-10</a:t>
             </a:fld>
             <a:endParaRPr lang="en-US"/>
           </a:p>
@@ -1793,9 +2200,9 @@
           <a:bodyPr/>
           <a:lstStyle/>
           <a:p>
-            <a:fld id="{665393C4-2231-440C-A42F-19E1CAA437CB}" type="datetimeFigureOut">
+            <a:fld id="{1C252357-6BCF-4AA4-A76A-0CF0527EF0B1}" type="datetime1">
               <a:rPr lang="en-US" smtClean="0"/>
-              <a:t>2015-08-17</a:t>
+              <a:t>2016-03-10</a:t>
             </a:fld>
             <a:endParaRPr lang="en-US"/>
           </a:p>
@@ -1911,9 +2318,9 @@
           <a:bodyPr/>
           <a:lstStyle/>
           <a:p>
-            <a:fld id="{665393C4-2231-440C-A42F-19E1CAA437CB}" type="datetimeFigureOut">
+            <a:fld id="{DD9EF5CD-439F-4026-B689-09ABD1BA3113}" type="datetime1">
               <a:rPr lang="en-US" smtClean="0"/>
-              <a:t>2015-08-17</a:t>
+              <a:t>2016-03-10</a:t>
             </a:fld>
             <a:endParaRPr lang="en-US"/>
           </a:p>
@@ -2006,9 +2413,9 @@
           <a:bodyPr/>
           <a:lstStyle/>
           <a:p>
-            <a:fld id="{665393C4-2231-440C-A42F-19E1CAA437CB}" type="datetimeFigureOut">
+            <a:fld id="{FF593EAD-4C25-487A-85E9-0CD01F35BA09}" type="datetime1">
               <a:rPr lang="en-US" smtClean="0"/>
-              <a:t>2015-08-17</a:t>
+              <a:t>2016-03-10</a:t>
             </a:fld>
             <a:endParaRPr lang="en-US"/>
           </a:p>
@@ -2283,9 +2690,9 @@
           <a:bodyPr/>
           <a:lstStyle/>
           <a:p>
-            <a:fld id="{665393C4-2231-440C-A42F-19E1CAA437CB}" type="datetimeFigureOut">
+            <a:fld id="{6E0BBACF-02E1-453F-9CD6-9CCFE82A6447}" type="datetime1">
               <a:rPr lang="en-US" smtClean="0"/>
-              <a:t>2015-08-17</a:t>
+              <a:t>2016-03-10</a:t>
             </a:fld>
             <a:endParaRPr lang="en-US"/>
           </a:p>
@@ -2536,9 +2943,9 @@
           <a:bodyPr/>
           <a:lstStyle/>
           <a:p>
-            <a:fld id="{665393C4-2231-440C-A42F-19E1CAA437CB}" type="datetimeFigureOut">
+            <a:fld id="{620E06AB-0A00-495E-B101-2A0F61B8ABAC}" type="datetime1">
               <a:rPr lang="en-US" smtClean="0"/>
-              <a:t>2015-08-17</a:t>
+              <a:t>2016-03-10</a:t>
             </a:fld>
             <a:endParaRPr lang="en-US"/>
           </a:p>
@@ -2749,9 +3156,9 @@
             </a:lvl1pPr>
           </a:lstStyle>
           <a:p>
-            <a:fld id="{665393C4-2231-440C-A42F-19E1CAA437CB}" type="datetimeFigureOut">
+            <a:fld id="{5058D07A-0D04-4460-9B67-EC96528153EF}" type="datetime1">
               <a:rPr lang="en-US" smtClean="0"/>
-              <a:t>2015-08-17</a:t>
+              <a:t>2016-03-10</a:t>
             </a:fld>
             <a:endParaRPr lang="en-US"/>
           </a:p>
@@ -2856,6 +3263,7 @@
     <p:sldLayoutId id="2147483658" r:id="rId10"/>
     <p:sldLayoutId id="2147483659" r:id="rId11"/>
   </p:sldLayoutIdLst>
+  <p:hf hdr="0" ftr="0" dt="0"/>
   <p:txStyles>
     <p:titleStyle>
       <a:lvl1pPr algn="ctr" defTabSz="914400" rtl="0" eaLnBrk="1" latinLnBrk="0" hangingPunct="1">
@@ -3166,9 +3574,48 @@
           <a:p>
             <a:r>
               <a:rPr lang="en-US" dirty="0" smtClean="0"/>
-              <a:t>Geert Jan Bex</a:t>
+              <a:t>Geert Jan </a:t>
+            </a:r>
+            <a:r>
+              <a:rPr lang="en-US" dirty="0" smtClean="0"/>
+              <a:t>Bex</a:t>
+            </a:r>
+          </a:p>
+          <a:p>
+            <a:r>
+              <a:rPr lang="en-US" dirty="0" smtClean="0">
+                <a:hlinkClick r:id="rId2"/>
+              </a:rPr>
+              <a:t>geertjan.bex@uhasselt.be</a:t>
+            </a:r>
+            <a:r>
+              <a:rPr lang="en-US" dirty="0" smtClean="0"/>
+              <a:t> </a:t>
             </a:r>
             <a:endParaRPr lang="en-US" dirty="0"/>
+          </a:p>
+        </p:txBody>
+      </p:sp>
+      <p:sp>
+        <p:nvSpPr>
+          <p:cNvPr id="4" name="Slide Number Placeholder 3"/>
+          <p:cNvSpPr>
+            <a:spLocks noGrp="1"/>
+          </p:cNvSpPr>
+          <p:nvPr>
+            <p:ph type="sldNum" sz="quarter" idx="12"/>
+          </p:nvPr>
+        </p:nvSpPr>
+        <p:spPr/>
+        <p:txBody>
+          <a:bodyPr/>
+          <a:lstStyle/>
+          <a:p>
+            <a:fld id="{D68CEE66-F348-4858-AA29-B71D1B0EBBA6}" type="slidenum">
+              <a:rPr lang="en-US" smtClean="0"/>
+              <a:t>1</a:t>
+            </a:fld>
+            <a:endParaRPr lang="en-US"/>
           </a:p>
         </p:txBody>
       </p:sp>
@@ -3707,47 +4154,22 @@
                   <a:latin typeface="Courier New" pitchFamily="49" charset="0"/>
                   <a:cs typeface="Courier New" pitchFamily="49" charset="0"/>
                 </a:rPr>
-                <a:t>    </a:t>
+                <a:t>    print(</a:t>
+              </a:r>
+              <a:r>
+                <a:rPr lang="en-US" dirty="0" err="1" smtClean="0">
+                  <a:latin typeface="Courier New" pitchFamily="49" charset="0"/>
+                  <a:cs typeface="Courier New" pitchFamily="49" charset="0"/>
+                </a:rPr>
+                <a:t>log_map</a:t>
               </a:r>
               <a:r>
                 <a:rPr lang="en-US" dirty="0" smtClean="0">
                   <a:latin typeface="Courier New" pitchFamily="49" charset="0"/>
                   <a:cs typeface="Courier New" pitchFamily="49" charset="0"/>
                 </a:rPr>
-                <a:t>print(</a:t>
-              </a:r>
-              <a:r>
-                <a:rPr lang="en-US" dirty="0" err="1" smtClean="0">
-                  <a:latin typeface="Courier New" pitchFamily="49" charset="0"/>
-                  <a:cs typeface="Courier New" pitchFamily="49" charset="0"/>
-                </a:rPr>
-                <a:t>log_map</a:t>
-              </a:r>
-              <a:r>
-                <a:rPr lang="en-US" dirty="0" smtClean="0">
-                  <a:latin typeface="Courier New" pitchFamily="49" charset="0"/>
-                  <a:cs typeface="Courier New" pitchFamily="49" charset="0"/>
-                </a:rPr>
-                <a:t>(0.5</a:t>
-              </a:r>
-              <a:r>
-                <a:rPr lang="en-US" dirty="0" smtClean="0">
-                  <a:latin typeface="Courier New" pitchFamily="49" charset="0"/>
-                  <a:cs typeface="Courier New" pitchFamily="49" charset="0"/>
-                </a:rPr>
-                <a:t>, 3.2, 1000</a:t>
-              </a:r>
-              <a:r>
-                <a:rPr lang="en-US" dirty="0" smtClean="0">
-                  <a:latin typeface="Courier New" pitchFamily="49" charset="0"/>
-                  <a:cs typeface="Courier New" pitchFamily="49" charset="0"/>
-                </a:rPr>
-                <a:t>))</a:t>
-              </a:r>
-              <a:endParaRPr lang="en-US" dirty="0" smtClean="0">
-                <a:latin typeface="Courier New" pitchFamily="49" charset="0"/>
-                <a:cs typeface="Courier New" pitchFamily="49" charset="0"/>
-              </a:endParaRPr>
+                <a:t>(0.5, 3.2, 1000))</a:t>
+              </a:r>
             </a:p>
           </p:txBody>
         </p:sp>
@@ -3795,6 +4217,29 @@
           </p:txBody>
         </p:sp>
       </p:grpSp>
+      <p:sp>
+        <p:nvSpPr>
+          <p:cNvPr id="2" name="Slide Number Placeholder 1"/>
+          <p:cNvSpPr>
+            <a:spLocks noGrp="1"/>
+          </p:cNvSpPr>
+          <p:nvPr>
+            <p:ph type="sldNum" sz="quarter" idx="12"/>
+          </p:nvPr>
+        </p:nvSpPr>
+        <p:spPr/>
+        <p:txBody>
+          <a:bodyPr/>
+          <a:lstStyle/>
+          <a:p>
+            <a:fld id="{D68CEE66-F348-4858-AA29-B71D1B0EBBA6}" type="slidenum">
+              <a:rPr lang="en-US" smtClean="0"/>
+              <a:t>10</a:t>
+            </a:fld>
+            <a:endParaRPr lang="en-US"/>
+          </a:p>
+        </p:txBody>
+      </p:sp>
     </p:spTree>
     <p:extLst>
       <p:ext uri="{BB962C8B-B14F-4D97-AF65-F5344CB8AC3E}">
@@ -6125,6 +6570,29 @@
           </a:p>
         </p:txBody>
       </p:sp>
+      <p:sp>
+        <p:nvSpPr>
+          <p:cNvPr id="5" name="Slide Number Placeholder 4"/>
+          <p:cNvSpPr>
+            <a:spLocks noGrp="1"/>
+          </p:cNvSpPr>
+          <p:nvPr>
+            <p:ph type="sldNum" sz="quarter" idx="12"/>
+          </p:nvPr>
+        </p:nvSpPr>
+        <p:spPr/>
+        <p:txBody>
+          <a:bodyPr/>
+          <a:lstStyle/>
+          <a:p>
+            <a:fld id="{D68CEE66-F348-4858-AA29-B71D1B0EBBA6}" type="slidenum">
+              <a:rPr lang="en-US" smtClean="0"/>
+              <a:t>11</a:t>
+            </a:fld>
+            <a:endParaRPr lang="en-US"/>
+          </a:p>
+        </p:txBody>
+      </p:sp>
     </p:spTree>
     <p:extLst>
       <p:ext uri="{BB962C8B-B14F-4D97-AF65-F5344CB8AC3E}">
@@ -6593,6 +7061,29 @@
           </p:txBody>
         </p:sp>
       </p:grpSp>
+      <p:sp>
+        <p:nvSpPr>
+          <p:cNvPr id="9" name="Slide Number Placeholder 8"/>
+          <p:cNvSpPr>
+            <a:spLocks noGrp="1"/>
+          </p:cNvSpPr>
+          <p:nvPr>
+            <p:ph type="sldNum" sz="quarter" idx="12"/>
+          </p:nvPr>
+        </p:nvSpPr>
+        <p:spPr/>
+        <p:txBody>
+          <a:bodyPr/>
+          <a:lstStyle/>
+          <a:p>
+            <a:fld id="{D68CEE66-F348-4858-AA29-B71D1B0EBBA6}" type="slidenum">
+              <a:rPr lang="en-US" smtClean="0"/>
+              <a:t>12</a:t>
+            </a:fld>
+            <a:endParaRPr lang="en-US"/>
+          </a:p>
+        </p:txBody>
+      </p:sp>
     </p:spTree>
     <p:extLst>
       <p:ext uri="{BB962C8B-B14F-4D97-AF65-F5344CB8AC3E}">
@@ -7049,6 +7540,29 @@
           </p:txBody>
         </p:sp>
       </p:grpSp>
+      <p:sp>
+        <p:nvSpPr>
+          <p:cNvPr id="6" name="Slide Number Placeholder 5"/>
+          <p:cNvSpPr>
+            <a:spLocks noGrp="1"/>
+          </p:cNvSpPr>
+          <p:nvPr>
+            <p:ph type="sldNum" sz="quarter" idx="12"/>
+          </p:nvPr>
+        </p:nvSpPr>
+        <p:spPr/>
+        <p:txBody>
+          <a:bodyPr/>
+          <a:lstStyle/>
+          <a:p>
+            <a:fld id="{D68CEE66-F348-4858-AA29-B71D1B0EBBA6}" type="slidenum">
+              <a:rPr lang="en-US" smtClean="0"/>
+              <a:t>13</a:t>
+            </a:fld>
+            <a:endParaRPr lang="en-US"/>
+          </a:p>
+        </p:txBody>
+      </p:sp>
     </p:spTree>
     <p:extLst>
       <p:ext uri="{BB962C8B-B14F-4D97-AF65-F5344CB8AC3E}">
@@ -7786,6 +8300,29 @@
           </p:txBody>
         </p:sp>
       </p:grpSp>
+      <p:sp>
+        <p:nvSpPr>
+          <p:cNvPr id="9" name="Slide Number Placeholder 8"/>
+          <p:cNvSpPr>
+            <a:spLocks noGrp="1"/>
+          </p:cNvSpPr>
+          <p:nvPr>
+            <p:ph type="sldNum" sz="quarter" idx="12"/>
+          </p:nvPr>
+        </p:nvSpPr>
+        <p:spPr/>
+        <p:txBody>
+          <a:bodyPr/>
+          <a:lstStyle/>
+          <a:p>
+            <a:fld id="{D68CEE66-F348-4858-AA29-B71D1B0EBBA6}" type="slidenum">
+              <a:rPr lang="en-US" smtClean="0"/>
+              <a:t>14</a:t>
+            </a:fld>
+            <a:endParaRPr lang="en-US"/>
+          </a:p>
+        </p:txBody>
+      </p:sp>
     </p:spTree>
     <p:extLst>
       <p:ext uri="{BB962C8B-B14F-4D97-AF65-F5344CB8AC3E}">
@@ -8528,6 +9065,29 @@
           </p:style>
         </p:cxnSp>
       </p:grpSp>
+      <p:sp>
+        <p:nvSpPr>
+          <p:cNvPr id="8" name="Slide Number Placeholder 7"/>
+          <p:cNvSpPr>
+            <a:spLocks noGrp="1"/>
+          </p:cNvSpPr>
+          <p:nvPr>
+            <p:ph type="sldNum" sz="quarter" idx="12"/>
+          </p:nvPr>
+        </p:nvSpPr>
+        <p:spPr/>
+        <p:txBody>
+          <a:bodyPr/>
+          <a:lstStyle/>
+          <a:p>
+            <a:fld id="{D68CEE66-F348-4858-AA29-B71D1B0EBBA6}" type="slidenum">
+              <a:rPr lang="en-US" smtClean="0"/>
+              <a:t>15</a:t>
+            </a:fld>
+            <a:endParaRPr lang="en-US"/>
+          </a:p>
+        </p:txBody>
+      </p:sp>
     </p:spTree>
     <p:extLst>
       <p:ext uri="{BB962C8B-B14F-4D97-AF65-F5344CB8AC3E}">
@@ -9232,6 +9792,29 @@
           </p:txBody>
         </p:sp>
       </p:grpSp>
+      <p:sp>
+        <p:nvSpPr>
+          <p:cNvPr id="6" name="Slide Number Placeholder 5"/>
+          <p:cNvSpPr>
+            <a:spLocks noGrp="1"/>
+          </p:cNvSpPr>
+          <p:nvPr>
+            <p:ph type="sldNum" sz="quarter" idx="12"/>
+          </p:nvPr>
+        </p:nvSpPr>
+        <p:spPr/>
+        <p:txBody>
+          <a:bodyPr/>
+          <a:lstStyle/>
+          <a:p>
+            <a:fld id="{D68CEE66-F348-4858-AA29-B71D1B0EBBA6}" type="slidenum">
+              <a:rPr lang="en-US" smtClean="0"/>
+              <a:t>16</a:t>
+            </a:fld>
+            <a:endParaRPr lang="en-US"/>
+          </a:p>
+        </p:txBody>
+      </p:sp>
     </p:spTree>
     <p:extLst>
       <p:ext uri="{BB962C8B-B14F-4D97-AF65-F5344CB8AC3E}">
@@ -9349,6 +9932,29 @@
               <a:t>Write wrapper function that constructs and assigns the type</a:t>
             </a:r>
             <a:endParaRPr lang="en-US" dirty="0"/>
+          </a:p>
+        </p:txBody>
+      </p:sp>
+      <p:sp>
+        <p:nvSpPr>
+          <p:cNvPr id="4" name="Slide Number Placeholder 3"/>
+          <p:cNvSpPr>
+            <a:spLocks noGrp="1"/>
+          </p:cNvSpPr>
+          <p:nvPr>
+            <p:ph type="sldNum" sz="quarter" idx="12"/>
+          </p:nvPr>
+        </p:nvSpPr>
+        <p:spPr/>
+        <p:txBody>
+          <a:bodyPr/>
+          <a:lstStyle/>
+          <a:p>
+            <a:fld id="{D68CEE66-F348-4858-AA29-B71D1B0EBBA6}" type="slidenum">
+              <a:rPr lang="en-US" smtClean="0"/>
+              <a:t>17</a:t>
+            </a:fld>
+            <a:endParaRPr lang="en-US"/>
           </a:p>
         </p:txBody>
       </p:sp>
@@ -9669,6 +10275,29 @@
           </a:p>
         </p:txBody>
       </p:sp>
+      <p:sp>
+        <p:nvSpPr>
+          <p:cNvPr id="4" name="Slide Number Placeholder 3"/>
+          <p:cNvSpPr>
+            <a:spLocks noGrp="1"/>
+          </p:cNvSpPr>
+          <p:nvPr>
+            <p:ph type="sldNum" sz="quarter" idx="12"/>
+          </p:nvPr>
+        </p:nvSpPr>
+        <p:spPr/>
+        <p:txBody>
+          <a:bodyPr/>
+          <a:lstStyle/>
+          <a:p>
+            <a:fld id="{D68CEE66-F348-4858-AA29-B71D1B0EBBA6}" type="slidenum">
+              <a:rPr lang="en-US" smtClean="0"/>
+              <a:t>18</a:t>
+            </a:fld>
+            <a:endParaRPr lang="en-US"/>
+          </a:p>
+        </p:txBody>
+      </p:sp>
     </p:spTree>
     <p:extLst>
       <p:ext uri="{BB962C8B-B14F-4D97-AF65-F5344CB8AC3E}">
@@ -10188,6 +10817,29 @@
           </p:txBody>
         </p:sp>
       </p:grpSp>
+      <p:sp>
+        <p:nvSpPr>
+          <p:cNvPr id="9" name="Slide Number Placeholder 8"/>
+          <p:cNvSpPr>
+            <a:spLocks noGrp="1"/>
+          </p:cNvSpPr>
+          <p:nvPr>
+            <p:ph type="sldNum" sz="quarter" idx="12"/>
+          </p:nvPr>
+        </p:nvSpPr>
+        <p:spPr/>
+        <p:txBody>
+          <a:bodyPr/>
+          <a:lstStyle/>
+          <a:p>
+            <a:fld id="{D68CEE66-F348-4858-AA29-B71D1B0EBBA6}" type="slidenum">
+              <a:rPr lang="en-US" smtClean="0"/>
+              <a:t>19</a:t>
+            </a:fld>
+            <a:endParaRPr lang="en-US"/>
+          </a:p>
+        </p:txBody>
+      </p:sp>
     </p:spTree>
     <p:extLst>
       <p:ext uri="{BB962C8B-B14F-4D97-AF65-F5344CB8AC3E}">
@@ -10295,6 +10947,29 @@
               <a:t>Wrap your own C/C++/Fortran code</a:t>
             </a:r>
             <a:endParaRPr lang="en-US" dirty="0"/>
+          </a:p>
+        </p:txBody>
+      </p:sp>
+      <p:sp>
+        <p:nvSpPr>
+          <p:cNvPr id="4" name="Slide Number Placeholder 3"/>
+          <p:cNvSpPr>
+            <a:spLocks noGrp="1"/>
+          </p:cNvSpPr>
+          <p:nvPr>
+            <p:ph type="sldNum" sz="quarter" idx="12"/>
+          </p:nvPr>
+        </p:nvSpPr>
+        <p:spPr/>
+        <p:txBody>
+          <a:bodyPr/>
+          <a:lstStyle/>
+          <a:p>
+            <a:fld id="{D68CEE66-F348-4858-AA29-B71D1B0EBBA6}" type="slidenum">
+              <a:rPr lang="en-US" smtClean="0"/>
+              <a:t>2</a:t>
+            </a:fld>
+            <a:endParaRPr lang="en-US"/>
           </a:p>
         </p:txBody>
       </p:sp>
@@ -11170,6 +11845,29 @@
               <a:latin typeface="Courier New" pitchFamily="49" charset="0"/>
               <a:cs typeface="Courier New" pitchFamily="49" charset="0"/>
             </a:endParaRPr>
+          </a:p>
+        </p:txBody>
+      </p:sp>
+      <p:sp>
+        <p:nvSpPr>
+          <p:cNvPr id="10" name="Slide Number Placeholder 9"/>
+          <p:cNvSpPr>
+            <a:spLocks noGrp="1"/>
+          </p:cNvSpPr>
+          <p:nvPr>
+            <p:ph type="sldNum" sz="quarter" idx="12"/>
+          </p:nvPr>
+        </p:nvSpPr>
+        <p:spPr/>
+        <p:txBody>
+          <a:bodyPr/>
+          <a:lstStyle/>
+          <a:p>
+            <a:fld id="{D68CEE66-F348-4858-AA29-B71D1B0EBBA6}" type="slidenum">
+              <a:rPr lang="en-US" smtClean="0"/>
+              <a:t>20</a:t>
+            </a:fld>
+            <a:endParaRPr lang="en-US"/>
           </a:p>
         </p:txBody>
       </p:sp>
@@ -11944,6 +12642,29 @@
           </a:p>
         </p:txBody>
       </p:sp>
+      <p:sp>
+        <p:nvSpPr>
+          <p:cNvPr id="7" name="Slide Number Placeholder 6"/>
+          <p:cNvSpPr>
+            <a:spLocks noGrp="1"/>
+          </p:cNvSpPr>
+          <p:nvPr>
+            <p:ph type="sldNum" sz="quarter" idx="12"/>
+          </p:nvPr>
+        </p:nvSpPr>
+        <p:spPr/>
+        <p:txBody>
+          <a:bodyPr/>
+          <a:lstStyle/>
+          <a:p>
+            <a:fld id="{D68CEE66-F348-4858-AA29-B71D1B0EBBA6}" type="slidenum">
+              <a:rPr lang="en-US" smtClean="0"/>
+              <a:t>21</a:t>
+            </a:fld>
+            <a:endParaRPr lang="en-US"/>
+          </a:p>
+        </p:txBody>
+      </p:sp>
     </p:spTree>
     <p:extLst>
       <p:ext uri="{BB962C8B-B14F-4D97-AF65-F5344CB8AC3E}">
@@ -12580,6 +13301,29 @@
           </p:txBody>
         </p:sp>
       </p:grpSp>
+      <p:sp>
+        <p:nvSpPr>
+          <p:cNvPr id="3" name="Slide Number Placeholder 2"/>
+          <p:cNvSpPr>
+            <a:spLocks noGrp="1"/>
+          </p:cNvSpPr>
+          <p:nvPr>
+            <p:ph type="sldNum" sz="quarter" idx="12"/>
+          </p:nvPr>
+        </p:nvSpPr>
+        <p:spPr/>
+        <p:txBody>
+          <a:bodyPr/>
+          <a:lstStyle/>
+          <a:p>
+            <a:fld id="{D68CEE66-F348-4858-AA29-B71D1B0EBBA6}" type="slidenum">
+              <a:rPr lang="en-US" smtClean="0"/>
+              <a:t>22</a:t>
+            </a:fld>
+            <a:endParaRPr lang="en-US"/>
+          </a:p>
+        </p:txBody>
+      </p:sp>
     </p:spTree>
     <p:extLst>
       <p:ext uri="{BB962C8B-B14F-4D97-AF65-F5344CB8AC3E}">
@@ -13321,6 +14065,29 @@
           </p:style>
         </p:cxnSp>
       </p:grpSp>
+      <p:sp>
+        <p:nvSpPr>
+          <p:cNvPr id="10" name="Slide Number Placeholder 9"/>
+          <p:cNvSpPr>
+            <a:spLocks noGrp="1"/>
+          </p:cNvSpPr>
+          <p:nvPr>
+            <p:ph type="sldNum" sz="quarter" idx="12"/>
+          </p:nvPr>
+        </p:nvSpPr>
+        <p:spPr/>
+        <p:txBody>
+          <a:bodyPr/>
+          <a:lstStyle/>
+          <a:p>
+            <a:fld id="{D68CEE66-F348-4858-AA29-B71D1B0EBBA6}" type="slidenum">
+              <a:rPr lang="en-US" smtClean="0"/>
+              <a:t>23</a:t>
+            </a:fld>
+            <a:endParaRPr lang="en-US"/>
+          </a:p>
+        </p:txBody>
+      </p:sp>
     </p:spTree>
     <p:extLst>
       <p:ext uri="{BB962C8B-B14F-4D97-AF65-F5344CB8AC3E}">
@@ -13977,6 +14744,29 @@
           </p:txBody>
         </p:sp>
       </p:grpSp>
+      <p:sp>
+        <p:nvSpPr>
+          <p:cNvPr id="6" name="Slide Number Placeholder 5"/>
+          <p:cNvSpPr>
+            <a:spLocks noGrp="1"/>
+          </p:cNvSpPr>
+          <p:nvPr>
+            <p:ph type="sldNum" sz="quarter" idx="12"/>
+          </p:nvPr>
+        </p:nvSpPr>
+        <p:spPr/>
+        <p:txBody>
+          <a:bodyPr/>
+          <a:lstStyle/>
+          <a:p>
+            <a:fld id="{D68CEE66-F348-4858-AA29-B71D1B0EBBA6}" type="slidenum">
+              <a:rPr lang="en-US" smtClean="0"/>
+              <a:t>24</a:t>
+            </a:fld>
+            <a:endParaRPr lang="en-US"/>
+          </a:p>
+        </p:txBody>
+      </p:sp>
     </p:spTree>
     <p:extLst>
       <p:ext uri="{BB962C8B-B14F-4D97-AF65-F5344CB8AC3E}">
@@ -14116,6 +14906,29 @@
               <a:rPr lang="en-US" dirty="0" smtClean="0"/>
               <a:t>Many C++ features are supported</a:t>
             </a:r>
+          </a:p>
+        </p:txBody>
+      </p:sp>
+      <p:sp>
+        <p:nvSpPr>
+          <p:cNvPr id="4" name="Slide Number Placeholder 3"/>
+          <p:cNvSpPr>
+            <a:spLocks noGrp="1"/>
+          </p:cNvSpPr>
+          <p:nvPr>
+            <p:ph type="sldNum" sz="quarter" idx="12"/>
+          </p:nvPr>
+        </p:nvSpPr>
+        <p:spPr/>
+        <p:txBody>
+          <a:bodyPr/>
+          <a:lstStyle/>
+          <a:p>
+            <a:fld id="{D68CEE66-F348-4858-AA29-B71D1B0EBBA6}" type="slidenum">
+              <a:rPr lang="en-US" smtClean="0"/>
+              <a:t>25</a:t>
+            </a:fld>
+            <a:endParaRPr lang="en-US"/>
           </a:p>
         </p:txBody>
       </p:sp>
@@ -14583,6 +15396,29 @@
           </a:p>
         </p:txBody>
       </p:sp>
+      <p:sp>
+        <p:nvSpPr>
+          <p:cNvPr id="4" name="Slide Number Placeholder 3"/>
+          <p:cNvSpPr>
+            <a:spLocks noGrp="1"/>
+          </p:cNvSpPr>
+          <p:nvPr>
+            <p:ph type="sldNum" sz="quarter" idx="12"/>
+          </p:nvPr>
+        </p:nvSpPr>
+        <p:spPr/>
+        <p:txBody>
+          <a:bodyPr/>
+          <a:lstStyle/>
+          <a:p>
+            <a:fld id="{D68CEE66-F348-4858-AA29-B71D1B0EBBA6}" type="slidenum">
+              <a:rPr lang="en-US" smtClean="0"/>
+              <a:t>26</a:t>
+            </a:fld>
+            <a:endParaRPr lang="en-US"/>
+          </a:p>
+        </p:txBody>
+      </p:sp>
     </p:spTree>
     <p:extLst>
       <p:ext uri="{BB962C8B-B14F-4D97-AF65-F5344CB8AC3E}">
@@ -15177,6 +16013,29 @@
           </p:txBody>
         </p:sp>
       </p:grpSp>
+      <p:sp>
+        <p:nvSpPr>
+          <p:cNvPr id="2" name="Slide Number Placeholder 1"/>
+          <p:cNvSpPr>
+            <a:spLocks noGrp="1"/>
+          </p:cNvSpPr>
+          <p:nvPr>
+            <p:ph type="sldNum" sz="quarter" idx="12"/>
+          </p:nvPr>
+        </p:nvSpPr>
+        <p:spPr/>
+        <p:txBody>
+          <a:bodyPr/>
+          <a:lstStyle/>
+          <a:p>
+            <a:fld id="{D68CEE66-F348-4858-AA29-B71D1B0EBBA6}" type="slidenum">
+              <a:rPr lang="en-US" smtClean="0"/>
+              <a:t>27</a:t>
+            </a:fld>
+            <a:endParaRPr lang="en-US"/>
+          </a:p>
+        </p:txBody>
+      </p:sp>
     </p:spTree>
     <p:extLst>
       <p:ext uri="{BB962C8B-B14F-4D97-AF65-F5344CB8AC3E}">
@@ -15734,6 +16593,29 @@
           </p:txBody>
         </p:sp>
       </p:grpSp>
+      <p:sp>
+        <p:nvSpPr>
+          <p:cNvPr id="9" name="Slide Number Placeholder 8"/>
+          <p:cNvSpPr>
+            <a:spLocks noGrp="1"/>
+          </p:cNvSpPr>
+          <p:nvPr>
+            <p:ph type="sldNum" sz="quarter" idx="12"/>
+          </p:nvPr>
+        </p:nvSpPr>
+        <p:spPr/>
+        <p:txBody>
+          <a:bodyPr/>
+          <a:lstStyle/>
+          <a:p>
+            <a:fld id="{D68CEE66-F348-4858-AA29-B71D1B0EBBA6}" type="slidenum">
+              <a:rPr lang="en-US" smtClean="0"/>
+              <a:t>28</a:t>
+            </a:fld>
+            <a:endParaRPr lang="en-US"/>
+          </a:p>
+        </p:txBody>
+      </p:sp>
     </p:spTree>
     <p:extLst>
       <p:ext uri="{BB962C8B-B14F-4D97-AF65-F5344CB8AC3E}">
@@ -16377,6 +17259,29 @@
           </p:txBody>
         </p:sp>
       </p:grpSp>
+      <p:sp>
+        <p:nvSpPr>
+          <p:cNvPr id="3" name="Slide Number Placeholder 2"/>
+          <p:cNvSpPr>
+            <a:spLocks noGrp="1"/>
+          </p:cNvSpPr>
+          <p:nvPr>
+            <p:ph type="sldNum" sz="quarter" idx="12"/>
+          </p:nvPr>
+        </p:nvSpPr>
+        <p:spPr/>
+        <p:txBody>
+          <a:bodyPr/>
+          <a:lstStyle/>
+          <a:p>
+            <a:fld id="{D68CEE66-F348-4858-AA29-B71D1B0EBBA6}" type="slidenum">
+              <a:rPr lang="en-US" smtClean="0"/>
+              <a:t>29</a:t>
+            </a:fld>
+            <a:endParaRPr lang="en-US"/>
+          </a:p>
+        </p:txBody>
+      </p:sp>
     </p:spTree>
     <p:extLst>
       <p:ext uri="{BB962C8B-B14F-4D97-AF65-F5344CB8AC3E}">
@@ -16646,6 +17551,29 @@
               <a:t>May be overkill, harder to use, let's not go there</a:t>
             </a:r>
             <a:endParaRPr lang="en-US" dirty="0"/>
+          </a:p>
+        </p:txBody>
+      </p:sp>
+      <p:sp>
+        <p:nvSpPr>
+          <p:cNvPr id="4" name="Slide Number Placeholder 3"/>
+          <p:cNvSpPr>
+            <a:spLocks noGrp="1"/>
+          </p:cNvSpPr>
+          <p:nvPr>
+            <p:ph type="sldNum" sz="quarter" idx="12"/>
+          </p:nvPr>
+        </p:nvSpPr>
+        <p:spPr/>
+        <p:txBody>
+          <a:bodyPr/>
+          <a:lstStyle/>
+          <a:p>
+            <a:fld id="{D68CEE66-F348-4858-AA29-B71D1B0EBBA6}" type="slidenum">
+              <a:rPr lang="en-US" smtClean="0"/>
+              <a:t>3</a:t>
+            </a:fld>
+            <a:endParaRPr lang="en-US"/>
           </a:p>
         </p:txBody>
       </p:sp>
@@ -17583,6 +18511,29 @@
           </a:p>
         </p:txBody>
       </p:sp>
+      <p:sp>
+        <p:nvSpPr>
+          <p:cNvPr id="4" name="Slide Number Placeholder 3"/>
+          <p:cNvSpPr>
+            <a:spLocks noGrp="1"/>
+          </p:cNvSpPr>
+          <p:nvPr>
+            <p:ph type="sldNum" sz="quarter" idx="12"/>
+          </p:nvPr>
+        </p:nvSpPr>
+        <p:spPr/>
+        <p:txBody>
+          <a:bodyPr/>
+          <a:lstStyle/>
+          <a:p>
+            <a:fld id="{D68CEE66-F348-4858-AA29-B71D1B0EBBA6}" type="slidenum">
+              <a:rPr lang="en-US" smtClean="0"/>
+              <a:t>30</a:t>
+            </a:fld>
+            <a:endParaRPr lang="en-US"/>
+          </a:p>
+        </p:txBody>
+      </p:sp>
     </p:spTree>
     <p:extLst>
       <p:ext uri="{BB962C8B-B14F-4D97-AF65-F5344CB8AC3E}">
@@ -17868,21 +18819,7 @@
                   <a:latin typeface="Courier New" pitchFamily="49" charset="0"/>
                   <a:cs typeface="Courier New" pitchFamily="49" charset="0"/>
                 </a:rPr>
-                <a:t>	</a:t>
-              </a:r>
-              <a:r>
-                <a:rPr lang="en-US" dirty="0" smtClean="0">
-                  <a:latin typeface="Courier New" pitchFamily="49" charset="0"/>
-                  <a:cs typeface="Courier New" pitchFamily="49" charset="0"/>
-                </a:rPr>
-                <a:t>f2py3  </a:t>
-              </a:r>
-              <a:r>
-                <a:rPr lang="en-US" dirty="0" smtClean="0">
-                  <a:latin typeface="Courier New" pitchFamily="49" charset="0"/>
-                  <a:cs typeface="Courier New" pitchFamily="49" charset="0"/>
-                </a:rPr>
-                <a:t>-c  -m </a:t>
+                <a:t>	f2py3  -c  -m </a:t>
               </a:r>
               <a:r>
                 <a:rPr lang="en-US" dirty="0" err="1" smtClean="0">
@@ -17945,6 +18882,29 @@
           </p:txBody>
         </p:sp>
       </p:grpSp>
+      <p:sp>
+        <p:nvSpPr>
+          <p:cNvPr id="3" name="Slide Number Placeholder 2"/>
+          <p:cNvSpPr>
+            <a:spLocks noGrp="1"/>
+          </p:cNvSpPr>
+          <p:nvPr>
+            <p:ph type="sldNum" sz="quarter" idx="12"/>
+          </p:nvPr>
+        </p:nvSpPr>
+        <p:spPr/>
+        <p:txBody>
+          <a:bodyPr/>
+          <a:lstStyle/>
+          <a:p>
+            <a:fld id="{D68CEE66-F348-4858-AA29-B71D1B0EBBA6}" type="slidenum">
+              <a:rPr lang="en-US" smtClean="0"/>
+              <a:t>31</a:t>
+            </a:fld>
+            <a:endParaRPr lang="en-US"/>
+          </a:p>
+        </p:txBody>
+      </p:sp>
     </p:spTree>
     <p:extLst>
       <p:ext uri="{BB962C8B-B14F-4D97-AF65-F5344CB8AC3E}">
@@ -18033,15 +18993,7 @@
             </a:r>
             <a:r>
               <a:rPr lang="en-US" dirty="0" smtClean="0"/>
-              <a:t> </a:t>
-            </a:r>
-            <a:r>
-              <a:rPr lang="en-US" dirty="0" smtClean="0"/>
-              <a:t>is quite </a:t>
-            </a:r>
-            <a:r>
-              <a:rPr lang="en-US" dirty="0" smtClean="0"/>
-              <a:t>simple, part of </a:t>
+              <a:t> is quite simple, part of </a:t>
             </a:r>
             <a:r>
               <a:rPr lang="en-US" dirty="0" err="1" smtClean="0">
@@ -18070,11 +19022,7 @@
             </a:r>
             <a:r>
               <a:rPr lang="en-US" dirty="0" smtClean="0"/>
-              <a:t>, </a:t>
-            </a:r>
-            <a:r>
-              <a:rPr lang="en-US" dirty="0" smtClean="0"/>
-              <a:t>including </a:t>
+              <a:t>, including </a:t>
             </a:r>
             <a:r>
               <a:rPr lang="en-US" dirty="0" err="1" smtClean="0">
@@ -18093,6 +19041,29 @@
               <a:rPr lang="en-US" dirty="0" smtClean="0"/>
               <a:t>Fairly complete for Fortran 90/95, partial for Fortran 2003</a:t>
             </a:r>
+          </a:p>
+        </p:txBody>
+      </p:sp>
+      <p:sp>
+        <p:nvSpPr>
+          <p:cNvPr id="4" name="Slide Number Placeholder 3"/>
+          <p:cNvSpPr>
+            <a:spLocks noGrp="1"/>
+          </p:cNvSpPr>
+          <p:nvPr>
+            <p:ph type="sldNum" sz="quarter" idx="12"/>
+          </p:nvPr>
+        </p:nvSpPr>
+        <p:spPr/>
+        <p:txBody>
+          <a:bodyPr/>
+          <a:lstStyle/>
+          <a:p>
+            <a:fld id="{D68CEE66-F348-4858-AA29-B71D1B0EBBA6}" type="slidenum">
+              <a:rPr lang="en-US" smtClean="0"/>
+              <a:t>32</a:t>
+            </a:fld>
+            <a:endParaRPr lang="en-US"/>
           </a:p>
         </p:txBody>
       </p:sp>
@@ -18347,6 +19318,29 @@
           <a:bodyPr/>
           <a:lstStyle/>
           <a:p>
+            <a:endParaRPr lang="en-US"/>
+          </a:p>
+        </p:txBody>
+      </p:sp>
+      <p:sp>
+        <p:nvSpPr>
+          <p:cNvPr id="4" name="Slide Number Placeholder 3"/>
+          <p:cNvSpPr>
+            <a:spLocks noGrp="1"/>
+          </p:cNvSpPr>
+          <p:nvPr>
+            <p:ph type="sldNum" sz="quarter" idx="12"/>
+          </p:nvPr>
+        </p:nvSpPr>
+        <p:spPr/>
+        <p:txBody>
+          <a:bodyPr/>
+          <a:lstStyle/>
+          <a:p>
+            <a:fld id="{D68CEE66-F348-4858-AA29-B71D1B0EBBA6}" type="slidenum">
+              <a:rPr lang="en-US" smtClean="0"/>
+              <a:t>4</a:t>
+            </a:fld>
             <a:endParaRPr lang="en-US"/>
           </a:p>
         </p:txBody>
@@ -18861,6 +19855,29 @@
           </mc:Fallback>
         </mc:AlternateContent>
       </p:grpSp>
+      <p:sp>
+        <p:nvSpPr>
+          <p:cNvPr id="7" name="Slide Number Placeholder 6"/>
+          <p:cNvSpPr>
+            <a:spLocks noGrp="1"/>
+          </p:cNvSpPr>
+          <p:nvPr>
+            <p:ph type="sldNum" sz="quarter" idx="12"/>
+          </p:nvPr>
+        </p:nvSpPr>
+        <p:spPr/>
+        <p:txBody>
+          <a:bodyPr/>
+          <a:lstStyle/>
+          <a:p>
+            <a:fld id="{D68CEE66-F348-4858-AA29-B71D1B0EBBA6}" type="slidenum">
+              <a:rPr lang="en-US" smtClean="0"/>
+              <a:t>5</a:t>
+            </a:fld>
+            <a:endParaRPr lang="en-US"/>
+          </a:p>
+        </p:txBody>
+      </p:sp>
     </p:spTree>
     <p:extLst>
       <p:ext uri="{BB962C8B-B14F-4D97-AF65-F5344CB8AC3E}">
@@ -19434,6 +20451,29 @@
           </p:txBody>
         </p:sp>
       </p:grpSp>
+      <p:sp>
+        <p:nvSpPr>
+          <p:cNvPr id="2" name="Slide Number Placeholder 1"/>
+          <p:cNvSpPr>
+            <a:spLocks noGrp="1"/>
+          </p:cNvSpPr>
+          <p:nvPr>
+            <p:ph type="sldNum" sz="quarter" idx="12"/>
+          </p:nvPr>
+        </p:nvSpPr>
+        <p:spPr/>
+        <p:txBody>
+          <a:bodyPr/>
+          <a:lstStyle/>
+          <a:p>
+            <a:fld id="{D68CEE66-F348-4858-AA29-B71D1B0EBBA6}" type="slidenum">
+              <a:rPr lang="en-US" smtClean="0"/>
+              <a:t>6</a:t>
+            </a:fld>
+            <a:endParaRPr lang="en-US"/>
+          </a:p>
+        </p:txBody>
+      </p:sp>
     </p:spTree>
     <p:extLst>
       <p:ext uri="{BB962C8B-B14F-4D97-AF65-F5344CB8AC3E}">
@@ -19815,6 +20855,29 @@
               <a:t> 4.6.2</a:t>
             </a:r>
             <a:endParaRPr lang="en-US" sz="2000" dirty="0"/>
+          </a:p>
+        </p:txBody>
+      </p:sp>
+      <p:sp>
+        <p:nvSpPr>
+          <p:cNvPr id="7" name="Slide Number Placeholder 6"/>
+          <p:cNvSpPr>
+            <a:spLocks noGrp="1"/>
+          </p:cNvSpPr>
+          <p:nvPr>
+            <p:ph type="sldNum" sz="quarter" idx="12"/>
+          </p:nvPr>
+        </p:nvSpPr>
+        <p:spPr/>
+        <p:txBody>
+          <a:bodyPr/>
+          <a:lstStyle/>
+          <a:p>
+            <a:fld id="{D68CEE66-F348-4858-AA29-B71D1B0EBBA6}" type="slidenum">
+              <a:rPr lang="en-US" smtClean="0"/>
+              <a:t>7</a:t>
+            </a:fld>
+            <a:endParaRPr lang="en-US"/>
           </a:p>
         </p:txBody>
       </p:sp>
@@ -20547,6 +21610,29 @@
               <a:t>Best done in C!</a:t>
             </a:r>
             <a:endParaRPr lang="en-US" sz="2400" dirty="0"/>
+          </a:p>
+        </p:txBody>
+      </p:sp>
+      <p:sp>
+        <p:nvSpPr>
+          <p:cNvPr id="10" name="Slide Number Placeholder 9"/>
+          <p:cNvSpPr>
+            <a:spLocks noGrp="1"/>
+          </p:cNvSpPr>
+          <p:nvPr>
+            <p:ph type="sldNum" sz="quarter" idx="12"/>
+          </p:nvPr>
+        </p:nvSpPr>
+        <p:spPr/>
+        <p:txBody>
+          <a:bodyPr/>
+          <a:lstStyle/>
+          <a:p>
+            <a:fld id="{D68CEE66-F348-4858-AA29-B71D1B0EBBA6}" type="slidenum">
+              <a:rPr lang="en-US" smtClean="0"/>
+              <a:t>8</a:t>
+            </a:fld>
+            <a:endParaRPr lang="en-US"/>
           </a:p>
         </p:txBody>
       </p:sp>
@@ -21195,26 +22281,35 @@
                 <a:latin typeface="Courier New" pitchFamily="49" charset="0"/>
                 <a:cs typeface="Courier New" pitchFamily="49" charset="0"/>
               </a:rPr>
-              <a:t>(0.5</a:t>
-            </a:r>
-            <a:r>
-              <a:rPr lang="en-US" dirty="0" smtClean="0">
-                <a:latin typeface="Courier New" pitchFamily="49" charset="0"/>
-                <a:cs typeface="Courier New" pitchFamily="49" charset="0"/>
-              </a:rPr>
-              <a:t>, 3.2, 1000</a:t>
-            </a:r>
-            <a:r>
-              <a:rPr lang="en-US" dirty="0" smtClean="0">
-                <a:latin typeface="Courier New" pitchFamily="49" charset="0"/>
-                <a:cs typeface="Courier New" pitchFamily="49" charset="0"/>
-              </a:rPr>
-              <a:t>))</a:t>
+              <a:t>(0.5, 3.2, 1000))</a:t>
             </a:r>
             <a:endParaRPr lang="en-US" dirty="0">
               <a:latin typeface="Courier New" pitchFamily="49" charset="0"/>
               <a:cs typeface="Courier New" pitchFamily="49" charset="0"/>
             </a:endParaRPr>
+          </a:p>
+        </p:txBody>
+      </p:sp>
+      <p:sp>
+        <p:nvSpPr>
+          <p:cNvPr id="8" name="Slide Number Placeholder 7"/>
+          <p:cNvSpPr>
+            <a:spLocks noGrp="1"/>
+          </p:cNvSpPr>
+          <p:nvPr>
+            <p:ph type="sldNum" sz="quarter" idx="12"/>
+          </p:nvPr>
+        </p:nvSpPr>
+        <p:spPr/>
+        <p:txBody>
+          <a:bodyPr/>
+          <a:lstStyle/>
+          <a:p>
+            <a:fld id="{D68CEE66-F348-4858-AA29-B71D1B0EBBA6}" type="slidenum">
+              <a:rPr lang="en-US" smtClean="0"/>
+              <a:t>9</a:t>
+            </a:fld>
+            <a:endParaRPr lang="en-US"/>
           </a:p>
         </p:txBody>
       </p:sp>
@@ -21907,4 +23002,289 @@
   <a:objectDefaults/>
   <a:extraClrSchemeLst/>
 </a:theme>
+</file>
+
+<file path=ppt/theme/theme2.xml><?xml version="1.0" encoding="utf-8"?>
+<a:theme xmlns:a="http://schemas.openxmlformats.org/drawingml/2006/main" name="Office Theme">
+  <a:themeElements>
+    <a:clrScheme name="Office">
+      <a:dk1>
+        <a:sysClr val="windowText" lastClr="000000"/>
+      </a:dk1>
+      <a:lt1>
+        <a:sysClr val="window" lastClr="FFFFFF"/>
+      </a:lt1>
+      <a:dk2>
+        <a:srgbClr val="1F497D"/>
+      </a:dk2>
+      <a:lt2>
+        <a:srgbClr val="EEECE1"/>
+      </a:lt2>
+      <a:accent1>
+        <a:srgbClr val="4F81BD"/>
+      </a:accent1>
+      <a:accent2>
+        <a:srgbClr val="C0504D"/>
+      </a:accent2>
+      <a:accent3>
+        <a:srgbClr val="9BBB59"/>
+      </a:accent3>
+      <a:accent4>
+        <a:srgbClr val="8064A2"/>
+      </a:accent4>
+      <a:accent5>
+        <a:srgbClr val="4BACC6"/>
+      </a:accent5>
+      <a:accent6>
+        <a:srgbClr val="F79646"/>
+      </a:accent6>
+      <a:hlink>
+        <a:srgbClr val="0000FF"/>
+      </a:hlink>
+      <a:folHlink>
+        <a:srgbClr val="800080"/>
+      </a:folHlink>
+    </a:clrScheme>
+    <a:fontScheme name="Office">
+      <a:majorFont>
+        <a:latin typeface="Calibri"/>
+        <a:ea typeface=""/>
+        <a:cs typeface=""/>
+        <a:font script="Jpan" typeface="ＭＳ Ｐゴシック"/>
+        <a:font script="Hang" typeface="맑은 고딕"/>
+        <a:font script="Hans" typeface="宋体"/>
+        <a:font script="Hant" typeface="新細明體"/>
+        <a:font script="Arab" typeface="Times New Roman"/>
+        <a:font script="Hebr" typeface="Times New Roman"/>
+        <a:font script="Thai" typeface="Angsana New"/>
+        <a:font script="Ethi" typeface="Nyala"/>
+        <a:font script="Beng" typeface="Vrinda"/>
+        <a:font script="Gujr" typeface="Shruti"/>
+        <a:font script="Khmr" typeface="MoolBoran"/>
+        <a:font script="Knda" typeface="Tunga"/>
+        <a:font script="Guru" typeface="Raavi"/>
+        <a:font script="Cans" typeface="Euphemia"/>
+        <a:font script="Cher" typeface="Plantagenet Cherokee"/>
+        <a:font script="Yiii" typeface="Microsoft Yi Baiti"/>
+        <a:font script="Tibt" typeface="Microsoft Himalaya"/>
+        <a:font script="Thaa" typeface="MV Boli"/>
+        <a:font script="Deva" typeface="Mangal"/>
+        <a:font script="Telu" typeface="Gautami"/>
+        <a:font script="Taml" typeface="Latha"/>
+        <a:font script="Syrc" typeface="Estrangelo Edessa"/>
+        <a:font script="Orya" typeface="Kalinga"/>
+        <a:font script="Mlym" typeface="Kartika"/>
+        <a:font script="Laoo" typeface="DokChampa"/>
+        <a:font script="Sinh" typeface="Iskoola Pota"/>
+        <a:font script="Mong" typeface="Mongolian Baiti"/>
+        <a:font script="Viet" typeface="Times New Roman"/>
+        <a:font script="Uigh" typeface="Microsoft Uighur"/>
+        <a:font script="Geor" typeface="Sylfaen"/>
+      </a:majorFont>
+      <a:minorFont>
+        <a:latin typeface="Calibri"/>
+        <a:ea typeface=""/>
+        <a:cs typeface=""/>
+        <a:font script="Jpan" typeface="ＭＳ Ｐゴシック"/>
+        <a:font script="Hang" typeface="맑은 고딕"/>
+        <a:font script="Hans" typeface="宋体"/>
+        <a:font script="Hant" typeface="新細明體"/>
+        <a:font script="Arab" typeface="Arial"/>
+        <a:font script="Hebr" typeface="Arial"/>
+        <a:font script="Thai" typeface="Cordia New"/>
+        <a:font script="Ethi" typeface="Nyala"/>
+        <a:font script="Beng" typeface="Vrinda"/>
+        <a:font script="Gujr" typeface="Shruti"/>
+        <a:font script="Khmr" typeface="DaunPenh"/>
+        <a:font script="Knda" typeface="Tunga"/>
+        <a:font script="Guru" typeface="Raavi"/>
+        <a:font script="Cans" typeface="Euphemia"/>
+        <a:font script="Cher" typeface="Plantagenet Cherokee"/>
+        <a:font script="Yiii" typeface="Microsoft Yi Baiti"/>
+        <a:font script="Tibt" typeface="Microsoft Himalaya"/>
+        <a:font script="Thaa" typeface="MV Boli"/>
+        <a:font script="Deva" typeface="Mangal"/>
+        <a:font script="Telu" typeface="Gautami"/>
+        <a:font script="Taml" typeface="Latha"/>
+        <a:font script="Syrc" typeface="Estrangelo Edessa"/>
+        <a:font script="Orya" typeface="Kalinga"/>
+        <a:font script="Mlym" typeface="Kartika"/>
+        <a:font script="Laoo" typeface="DokChampa"/>
+        <a:font script="Sinh" typeface="Iskoola Pota"/>
+        <a:font script="Mong" typeface="Mongolian Baiti"/>
+        <a:font script="Viet" typeface="Arial"/>
+        <a:font script="Uigh" typeface="Microsoft Uighur"/>
+        <a:font script="Geor" typeface="Sylfaen"/>
+      </a:minorFont>
+    </a:fontScheme>
+    <a:fmtScheme name="Office">
+      <a:fillStyleLst>
+        <a:solidFill>
+          <a:schemeClr val="phClr"/>
+        </a:solidFill>
+        <a:gradFill rotWithShape="1">
+          <a:gsLst>
+            <a:gs pos="0">
+              <a:schemeClr val="phClr">
+                <a:tint val="50000"/>
+                <a:satMod val="300000"/>
+              </a:schemeClr>
+            </a:gs>
+            <a:gs pos="35000">
+              <a:schemeClr val="phClr">
+                <a:tint val="37000"/>
+                <a:satMod val="300000"/>
+              </a:schemeClr>
+            </a:gs>
+            <a:gs pos="100000">
+              <a:schemeClr val="phClr">
+                <a:tint val="15000"/>
+                <a:satMod val="350000"/>
+              </a:schemeClr>
+            </a:gs>
+          </a:gsLst>
+          <a:lin ang="16200000" scaled="1"/>
+        </a:gradFill>
+        <a:gradFill rotWithShape="1">
+          <a:gsLst>
+            <a:gs pos="0">
+              <a:schemeClr val="phClr">
+                <a:shade val="51000"/>
+                <a:satMod val="130000"/>
+              </a:schemeClr>
+            </a:gs>
+            <a:gs pos="80000">
+              <a:schemeClr val="phClr">
+                <a:shade val="93000"/>
+                <a:satMod val="130000"/>
+              </a:schemeClr>
+            </a:gs>
+            <a:gs pos="100000">
+              <a:schemeClr val="phClr">
+                <a:shade val="94000"/>
+                <a:satMod val="135000"/>
+              </a:schemeClr>
+            </a:gs>
+          </a:gsLst>
+          <a:lin ang="16200000" scaled="0"/>
+        </a:gradFill>
+      </a:fillStyleLst>
+      <a:lnStyleLst>
+        <a:ln w="9525" cap="flat" cmpd="sng" algn="ctr">
+          <a:solidFill>
+            <a:schemeClr val="phClr">
+              <a:shade val="95000"/>
+              <a:satMod val="105000"/>
+            </a:schemeClr>
+          </a:solidFill>
+          <a:prstDash val="solid"/>
+        </a:ln>
+        <a:ln w="25400" cap="flat" cmpd="sng" algn="ctr">
+          <a:solidFill>
+            <a:schemeClr val="phClr"/>
+          </a:solidFill>
+          <a:prstDash val="solid"/>
+        </a:ln>
+        <a:ln w="38100" cap="flat" cmpd="sng" algn="ctr">
+          <a:solidFill>
+            <a:schemeClr val="phClr"/>
+          </a:solidFill>
+          <a:prstDash val="solid"/>
+        </a:ln>
+      </a:lnStyleLst>
+      <a:effectStyleLst>
+        <a:effectStyle>
+          <a:effectLst>
+            <a:outerShdw blurRad="40000" dist="20000" dir="5400000" rotWithShape="0">
+              <a:srgbClr val="000000">
+                <a:alpha val="38000"/>
+              </a:srgbClr>
+            </a:outerShdw>
+          </a:effectLst>
+        </a:effectStyle>
+        <a:effectStyle>
+          <a:effectLst>
+            <a:outerShdw blurRad="40000" dist="23000" dir="5400000" rotWithShape="0">
+              <a:srgbClr val="000000">
+                <a:alpha val="35000"/>
+              </a:srgbClr>
+            </a:outerShdw>
+          </a:effectLst>
+        </a:effectStyle>
+        <a:effectStyle>
+          <a:effectLst>
+            <a:outerShdw blurRad="40000" dist="23000" dir="5400000" rotWithShape="0">
+              <a:srgbClr val="000000">
+                <a:alpha val="35000"/>
+              </a:srgbClr>
+            </a:outerShdw>
+          </a:effectLst>
+          <a:scene3d>
+            <a:camera prst="orthographicFront">
+              <a:rot lat="0" lon="0" rev="0"/>
+            </a:camera>
+            <a:lightRig rig="threePt" dir="t">
+              <a:rot lat="0" lon="0" rev="1200000"/>
+            </a:lightRig>
+          </a:scene3d>
+          <a:sp3d>
+            <a:bevelT w="63500" h="25400"/>
+          </a:sp3d>
+        </a:effectStyle>
+      </a:effectStyleLst>
+      <a:bgFillStyleLst>
+        <a:solidFill>
+          <a:schemeClr val="phClr"/>
+        </a:solidFill>
+        <a:gradFill rotWithShape="1">
+          <a:gsLst>
+            <a:gs pos="0">
+              <a:schemeClr val="phClr">
+                <a:tint val="40000"/>
+                <a:satMod val="350000"/>
+              </a:schemeClr>
+            </a:gs>
+            <a:gs pos="40000">
+              <a:schemeClr val="phClr">
+                <a:tint val="45000"/>
+                <a:shade val="99000"/>
+                <a:satMod val="350000"/>
+              </a:schemeClr>
+            </a:gs>
+            <a:gs pos="100000">
+              <a:schemeClr val="phClr">
+                <a:shade val="20000"/>
+                <a:satMod val="255000"/>
+              </a:schemeClr>
+            </a:gs>
+          </a:gsLst>
+          <a:path path="circle">
+            <a:fillToRect l="50000" t="-80000" r="50000" b="180000"/>
+          </a:path>
+        </a:gradFill>
+        <a:gradFill rotWithShape="1">
+          <a:gsLst>
+            <a:gs pos="0">
+              <a:schemeClr val="phClr">
+                <a:tint val="80000"/>
+                <a:satMod val="300000"/>
+              </a:schemeClr>
+            </a:gs>
+            <a:gs pos="100000">
+              <a:schemeClr val="phClr">
+                <a:shade val="30000"/>
+                <a:satMod val="200000"/>
+              </a:schemeClr>
+            </a:gs>
+          </a:gsLst>
+          <a:path path="circle">
+            <a:fillToRect l="50000" t="50000" r="50000" b="50000"/>
+          </a:path>
+        </a:gradFill>
+      </a:bgFillStyleLst>
+    </a:fmtScheme>
+  </a:themeElements>
+  <a:objectDefaults/>
+  <a:extraClrSchemeLst/>
+</a:theme>
 </file>
</xml_diff>